<commit_message>
Atualizacao no power point.
</commit_message>
<xml_diff>
--- a/GitFlow.pptx
+++ b/GitFlow.pptx
@@ -133,7 +133,7 @@
               <a:rPr b="0" lang="pt-BR" sz="1400" spc="-1" strike="noStrike">
                 <a:latin typeface="Times New Roman"/>
               </a:rPr>
-              <a:t>&lt;cabeçalho&gt;</a:t>
+              <a:t> </a:t>
             </a:r>
             <a:endParaRPr b="0" lang="pt-BR" sz="1400" spc="-1" strike="noStrike">
               <a:latin typeface="Times New Roman"/>
@@ -168,7 +168,7 @@
               <a:rPr b="0" lang="pt-BR" sz="1400" spc="-1" strike="noStrike">
                 <a:latin typeface="Times New Roman"/>
               </a:rPr>
-              <a:t>&lt;data/hora&gt;</a:t>
+              <a:t> </a:t>
             </a:r>
             <a:endParaRPr b="0" lang="pt-BR" sz="1400" spc="-1" strike="noStrike">
               <a:latin typeface="Times New Roman"/>
@@ -202,7 +202,7 @@
               <a:rPr b="0" lang="pt-BR" sz="1400" spc="-1" strike="noStrike">
                 <a:latin typeface="Times New Roman"/>
               </a:rPr>
-              <a:t>&lt;rodapé&gt;</a:t>
+              <a:t> </a:t>
             </a:r>
             <a:endParaRPr b="0" lang="pt-BR" sz="1400" spc="-1" strike="noStrike">
               <a:latin typeface="Times New Roman"/>
@@ -233,11 +233,11 @@
           <a:bodyPr lIns="0" rIns="0" tIns="0" bIns="0" anchor="b"/>
           <a:p>
             <a:pPr algn="r"/>
-            <a:fld id="{A16F3F67-7F16-4D95-A4A6-77F8392A67E6}" type="slidenum">
+            <a:fld id="{3A94BA73-B822-4D91-A396-B7BE73EA0088}" type="slidenum">
               <a:rPr b="0" lang="pt-BR" sz="1400" spc="-1" strike="noStrike">
                 <a:latin typeface="Times New Roman"/>
               </a:rPr>
-              <a:t>&lt;número&gt;</a:t>
+              <a:t>1</a:t>
             </a:fld>
             <a:endParaRPr b="0" lang="pt-BR" sz="1400" spc="-1" strike="noStrike">
               <a:latin typeface="Times New Roman"/>
@@ -281,7 +281,7 @@
         <p:spPr>
           <a:xfrm>
             <a:off x="685800" y="1143000"/>
-            <a:ext cx="5485680" cy="3085560"/>
+            <a:ext cx="5485320" cy="3085200"/>
           </a:xfrm>
           <a:prstGeom prst="rect">
             <a:avLst/>
@@ -301,7 +301,7 @@
         <p:spPr>
           <a:xfrm>
             <a:off x="685800" y="4400640"/>
-            <a:ext cx="5485680" cy="3599640"/>
+            <a:ext cx="5485320" cy="3599280"/>
           </a:xfrm>
           <a:prstGeom prst="rect">
             <a:avLst/>
@@ -325,7 +325,7 @@
         <p:spPr>
           <a:xfrm>
             <a:off x="3884760" y="8685360"/>
-            <a:ext cx="2971080" cy="457920"/>
+            <a:ext cx="2970720" cy="457560"/>
           </a:xfrm>
           <a:prstGeom prst="rect">
             <a:avLst/>
@@ -349,7 +349,7 @@
                 <a:spcPct val="100000"/>
               </a:lnSpc>
             </a:pPr>
-            <a:fld id="{206534B9-9249-48C5-8AA3-ECEB248500B8}" type="slidenum">
+            <a:fld id="{2CE785A3-6506-4AC3-A066-1E47D3415F41}" type="slidenum">
               <a:rPr b="0" lang="pt-BR" sz="1200" spc="-1" strike="noStrike">
                 <a:solidFill>
                   <a:srgbClr val="000000"/>
@@ -400,7 +400,7 @@
         <p:spPr>
           <a:xfrm>
             <a:off x="685800" y="1143000"/>
-            <a:ext cx="5485680" cy="3085560"/>
+            <a:ext cx="5485320" cy="3085200"/>
           </a:xfrm>
           <a:prstGeom prst="rect">
             <a:avLst/>
@@ -420,7 +420,7 @@
         <p:spPr>
           <a:xfrm>
             <a:off x="685800" y="4400640"/>
-            <a:ext cx="5485680" cy="3599640"/>
+            <a:ext cx="5485320" cy="3599280"/>
           </a:xfrm>
           <a:prstGeom prst="rect">
             <a:avLst/>
@@ -429,7 +429,7 @@
         <p:txBody>
           <a:bodyPr lIns="0" rIns="0" tIns="0" bIns="0"/>
           <a:p>
-            <a:pPr marL="216000" indent="-215640">
+            <a:pPr marL="216000" indent="-215280">
               <a:lnSpc>
                 <a:spcPct val="100000"/>
               </a:lnSpc>
@@ -469,7 +469,7 @@
         <p:spPr>
           <a:xfrm>
             <a:off x="3884760" y="8685360"/>
-            <a:ext cx="2971080" cy="457920"/>
+            <a:ext cx="2970720" cy="457560"/>
           </a:xfrm>
           <a:prstGeom prst="rect">
             <a:avLst/>
@@ -493,7 +493,7 @@
                 <a:spcPct val="100000"/>
               </a:lnSpc>
             </a:pPr>
-            <a:fld id="{B2B5FF3A-E752-4BD9-922E-B99C6E8E944E}" type="slidenum">
+            <a:fld id="{3693A2A5-0C17-4E59-B1C7-A8565562BE4A}" type="slidenum">
               <a:rPr b="0" lang="pt-BR" sz="1200" spc="-1" strike="noStrike">
                 <a:solidFill>
                   <a:srgbClr val="000000"/>
@@ -3207,8 +3207,8 @@
         </p:nvSpPr>
         <p:spPr>
           <a:xfrm>
-            <a:off x="838080" y="365040"/>
-            <a:ext cx="10514880" cy="1324800"/>
+            <a:off x="609480" y="273600"/>
+            <a:ext cx="10972080" cy="1144440"/>
           </a:xfrm>
           <a:prstGeom prst="rect">
             <a:avLst/>
@@ -3242,7 +3242,7 @@
         <p:spPr>
           <a:xfrm>
             <a:off x="609480" y="1604520"/>
-            <a:ext cx="10972440" cy="3977280"/>
+            <a:ext cx="10972080" cy="3976920"/>
           </a:xfrm>
           <a:prstGeom prst="rect">
             <a:avLst/>
@@ -3265,12 +3265,12 @@
               <a:buChar char=""/>
             </a:pPr>
             <a:r>
-              <a:rPr b="0" lang="pt-BR" sz="3200" spc="-1" strike="noStrike">
+              <a:rPr b="0" lang="pt-BR" sz="1800" spc="-1" strike="noStrike">
                 <a:latin typeface="Arial"/>
               </a:rPr>
               <a:t>Clique para editar o formato do texto da estrutura de tópicos</a:t>
             </a:r>
-            <a:endParaRPr b="0" lang="pt-BR" sz="3200" spc="-1" strike="noStrike">
+            <a:endParaRPr b="0" lang="pt-BR" sz="1800" spc="-1" strike="noStrike">
               <a:latin typeface="Arial"/>
             </a:endParaRPr>
           </a:p>
@@ -3287,12 +3287,12 @@
               <a:buChar char=""/>
             </a:pPr>
             <a:r>
-              <a:rPr b="0" lang="pt-BR" sz="2800" spc="-1" strike="noStrike">
+              <a:rPr b="0" lang="pt-BR" sz="1800" spc="-1" strike="noStrike">
                 <a:latin typeface="Arial"/>
               </a:rPr>
               <a:t>2.º nível da estrutura de tópicos</a:t>
             </a:r>
-            <a:endParaRPr b="0" lang="pt-BR" sz="2800" spc="-1" strike="noStrike">
+            <a:endParaRPr b="0" lang="pt-BR" sz="1800" spc="-1" strike="noStrike">
               <a:latin typeface="Arial"/>
             </a:endParaRPr>
           </a:p>
@@ -3309,12 +3309,12 @@
               <a:buChar char=""/>
             </a:pPr>
             <a:r>
-              <a:rPr b="0" lang="pt-BR" sz="2400" spc="-1" strike="noStrike">
+              <a:rPr b="0" lang="pt-BR" sz="1800" spc="-1" strike="noStrike">
                 <a:latin typeface="Arial"/>
               </a:rPr>
               <a:t>3.º nível da estrutura de tópicos</a:t>
             </a:r>
-            <a:endParaRPr b="0" lang="pt-BR" sz="2400" spc="-1" strike="noStrike">
+            <a:endParaRPr b="0" lang="pt-BR" sz="1800" spc="-1" strike="noStrike">
               <a:latin typeface="Arial"/>
             </a:endParaRPr>
           </a:p>
@@ -3331,12 +3331,12 @@
               <a:buChar char=""/>
             </a:pPr>
             <a:r>
-              <a:rPr b="0" lang="pt-BR" sz="2000" spc="-1" strike="noStrike">
+              <a:rPr b="0" lang="pt-BR" sz="1800" spc="-1" strike="noStrike">
                 <a:latin typeface="Arial"/>
               </a:rPr>
               <a:t>4.º nível da estrutura de tópicos</a:t>
             </a:r>
-            <a:endParaRPr b="0" lang="pt-BR" sz="2000" spc="-1" strike="noStrike">
+            <a:endParaRPr b="0" lang="pt-BR" sz="1800" spc="-1" strike="noStrike">
               <a:latin typeface="Arial"/>
             </a:endParaRPr>
           </a:p>
@@ -3353,12 +3353,12 @@
               <a:buChar char=""/>
             </a:pPr>
             <a:r>
-              <a:rPr b="0" lang="pt-BR" sz="2000" spc="-1" strike="noStrike">
+              <a:rPr b="0" lang="pt-BR" sz="1800" spc="-1" strike="noStrike">
                 <a:latin typeface="Arial"/>
               </a:rPr>
               <a:t>5.º nível da estrutura de tópicos</a:t>
             </a:r>
-            <a:endParaRPr b="0" lang="pt-BR" sz="2000" spc="-1" strike="noStrike">
+            <a:endParaRPr b="0" lang="pt-BR" sz="1800" spc="-1" strike="noStrike">
               <a:latin typeface="Arial"/>
             </a:endParaRPr>
           </a:p>
@@ -3375,12 +3375,12 @@
               <a:buChar char=""/>
             </a:pPr>
             <a:r>
-              <a:rPr b="0" lang="pt-BR" sz="2000" spc="-1" strike="noStrike">
+              <a:rPr b="0" lang="pt-BR" sz="1800" spc="-1" strike="noStrike">
                 <a:latin typeface="Arial"/>
               </a:rPr>
               <a:t>6.º nível da estrutura de tópicos</a:t>
             </a:r>
-            <a:endParaRPr b="0" lang="pt-BR" sz="2000" spc="-1" strike="noStrike">
+            <a:endParaRPr b="0" lang="pt-BR" sz="1800" spc="-1" strike="noStrike">
               <a:latin typeface="Arial"/>
             </a:endParaRPr>
           </a:p>
@@ -3397,12 +3397,12 @@
               <a:buChar char=""/>
             </a:pPr>
             <a:r>
-              <a:rPr b="0" lang="pt-BR" sz="2000" spc="-1" strike="noStrike">
+              <a:rPr b="0" lang="pt-BR" sz="1800" spc="-1" strike="noStrike">
                 <a:latin typeface="Arial"/>
               </a:rPr>
               <a:t>7.º nível da estrutura de tópicos</a:t>
             </a:r>
-            <a:endParaRPr b="0" lang="pt-BR" sz="2000" spc="-1" strike="noStrike">
+            <a:endParaRPr b="0" lang="pt-BR" sz="1800" spc="-1" strike="noStrike">
               <a:latin typeface="Arial"/>
             </a:endParaRPr>
           </a:p>
@@ -3705,7 +3705,7 @@
         <p:spPr>
           <a:xfrm>
             <a:off x="940320" y="2395440"/>
-            <a:ext cx="10907640" cy="1004400"/>
+            <a:ext cx="10907280" cy="1004040"/>
           </a:xfrm>
           <a:prstGeom prst="rect">
             <a:avLst/>
@@ -3747,6 +3747,14 @@
       </p:sp>
     </p:spTree>
   </p:cSld>
+  <mc:AlternateContent>
+    <mc:Choice Requires="p14">
+      <p:transition spd="slow" p14:dur="2000"/>
+    </mc:Choice>
+    <mc:Fallback>
+      <p:transition spd="slow"/>
+    </mc:Fallback>
+  </mc:AlternateContent>
   <p:timing>
     <p:tnLst>
       <p:par>
@@ -3807,7 +3815,7 @@
         <p:spPr>
           <a:xfrm>
             <a:off x="0" y="0"/>
-            <a:ext cx="12191400" cy="6857280"/>
+            <a:ext cx="12191040" cy="6856920"/>
           </a:xfrm>
           <a:prstGeom prst="rect">
             <a:avLst/>
@@ -3819,6 +3827,14 @@
       </p:pic>
     </p:spTree>
   </p:cSld>
+  <mc:AlternateContent>
+    <mc:Choice Requires="p14">
+      <p:transition spd="slow" p14:dur="2000"/>
+    </mc:Choice>
+    <mc:Fallback>
+      <p:transition spd="slow"/>
+    </mc:Fallback>
+  </mc:AlternateContent>
   <p:timing>
     <p:tnLst>
       <p:par>
@@ -3875,7 +3891,7 @@
         <p:spPr>
           <a:xfrm>
             <a:off x="838080" y="365040"/>
-            <a:ext cx="10514880" cy="1324800"/>
+            <a:ext cx="10514520" cy="1324440"/>
           </a:xfrm>
           <a:prstGeom prst="rect">
             <a:avLst/>
@@ -3905,6 +3921,7 @@
                   <a:srgbClr val="000000"/>
                 </a:solidFill>
                 <a:latin typeface="Calibri Light"/>
+                <a:ea typeface="DejaVu Sans"/>
               </a:rPr>
               <a:t>Preparação do ambiente local</a:t>
             </a:r>
@@ -3923,7 +3940,7 @@
         <p:spPr>
           <a:xfrm>
             <a:off x="838080" y="2675520"/>
-            <a:ext cx="10514880" cy="2668320"/>
+            <a:ext cx="10514520" cy="2667960"/>
           </a:xfrm>
           <a:prstGeom prst="rect">
             <a:avLst/>
@@ -3941,10 +3958,10 @@
         </p:style>
         <p:txBody>
           <a:bodyPr lIns="90000" rIns="90000" tIns="45000" bIns="45000">
-            <a:normAutofit/>
+            <a:normAutofit fontScale="83000"/>
           </a:bodyPr>
           <a:p>
-            <a:pPr marL="228600" indent="-227880">
+            <a:pPr marL="228600" indent="-227520">
               <a:lnSpc>
                 <a:spcPct val="90000"/>
               </a:lnSpc>
@@ -3963,6 +3980,7 @@
                   <a:srgbClr val="000000"/>
                 </a:solidFill>
                 <a:latin typeface="Calibri"/>
+                <a:ea typeface="DejaVu Sans"/>
               </a:rPr>
               <a:t>Instalação do Console2</a:t>
             </a:r>
@@ -3971,7 +3989,7 @@
             </a:endParaRPr>
           </a:p>
           <a:p>
-            <a:pPr marL="228600" indent="-227880">
+            <a:pPr marL="228600" indent="-227520">
               <a:lnSpc>
                 <a:spcPct val="90000"/>
               </a:lnSpc>
@@ -3990,6 +4008,7 @@
                   <a:srgbClr val="000000"/>
                 </a:solidFill>
                 <a:latin typeface="Calibri"/>
+                <a:ea typeface="DejaVu Sans"/>
               </a:rPr>
               <a:t>Configuração do posh git (Integração PowerShell com Git)</a:t>
             </a:r>
@@ -3998,7 +4017,7 @@
             </a:endParaRPr>
           </a:p>
           <a:p>
-            <a:pPr marL="228600" indent="-227880">
+            <a:pPr marL="228600" indent="-227520">
               <a:lnSpc>
                 <a:spcPct val="90000"/>
               </a:lnSpc>
@@ -4017,6 +4036,7 @@
                   <a:srgbClr val="000000"/>
                 </a:solidFill>
                 <a:latin typeface="Calibri"/>
+                <a:ea typeface="DejaVu Sans"/>
               </a:rPr>
               <a:t>Configuração do Console2 para posh git</a:t>
             </a:r>
@@ -4025,7 +4045,7 @@
             </a:endParaRPr>
           </a:p>
           <a:p>
-            <a:pPr marL="228600" indent="-227880">
+            <a:pPr marL="228600" indent="-227520">
               <a:lnSpc>
                 <a:spcPct val="90000"/>
               </a:lnSpc>
@@ -4044,6 +4064,7 @@
                   <a:srgbClr val="000000"/>
                 </a:solidFill>
                 <a:latin typeface="Calibri"/>
+                <a:ea typeface="DejaVu Sans"/>
               </a:rPr>
               <a:t>Configuração do KDiff3 como ferramenta de merge</a:t>
             </a:r>
@@ -4052,7 +4073,7 @@
             </a:endParaRPr>
           </a:p>
           <a:p>
-            <a:pPr marL="228600" indent="-227880">
+            <a:pPr marL="228600" indent="-227520">
               <a:lnSpc>
                 <a:spcPct val="90000"/>
               </a:lnSpc>
@@ -4071,6 +4092,7 @@
                   <a:srgbClr val="000000"/>
                 </a:solidFill>
                 <a:latin typeface="Calibri"/>
+                <a:ea typeface="DejaVu Sans"/>
               </a:rPr>
               <a:t>Instalação do Fork</a:t>
             </a:r>
@@ -4079,7 +4101,7 @@
             </a:endParaRPr>
           </a:p>
           <a:p>
-            <a:pPr marL="228600" indent="-227880">
+            <a:pPr marL="228600" indent="-227520">
               <a:lnSpc>
                 <a:spcPct val="90000"/>
               </a:lnSpc>
@@ -4098,6 +4120,7 @@
                   <a:srgbClr val="000000"/>
                 </a:solidFill>
                 <a:latin typeface="Calibri"/>
+                <a:ea typeface="DejaVu Sans"/>
               </a:rPr>
               <a:t>Clone do repositório</a:t>
             </a:r>
@@ -4106,7 +4129,7 @@
             </a:endParaRPr>
           </a:p>
           <a:p>
-            <a:pPr lvl="1" marL="685800" indent="-227880">
+            <a:pPr lvl="1" marL="685800" indent="-227520">
               <a:lnSpc>
                 <a:spcPct val="90000"/>
               </a:lnSpc>
@@ -4125,6 +4148,7 @@
                   <a:srgbClr val="7030a0"/>
                 </a:solidFill>
                 <a:latin typeface="Calibri"/>
+                <a:ea typeface="DejaVu Sans"/>
               </a:rPr>
               <a:t>git clone https://github.com/RickXavier/Git_Flow.git</a:t>
             </a:r>
@@ -4136,6 +4160,14 @@
       </p:sp>
     </p:spTree>
   </p:cSld>
+  <mc:AlternateContent>
+    <mc:Choice Requires="p14">
+      <p:transition spd="slow" p14:dur="2000"/>
+    </mc:Choice>
+    <mc:Fallback>
+      <p:transition spd="slow"/>
+    </mc:Fallback>
+  </mc:AlternateContent>
   <p:timing>
     <p:tnLst>
       <p:par>
@@ -4192,7 +4224,7 @@
         <p:spPr>
           <a:xfrm>
             <a:off x="838080" y="365040"/>
-            <a:ext cx="10514880" cy="1324800"/>
+            <a:ext cx="10514520" cy="1324440"/>
           </a:xfrm>
           <a:prstGeom prst="rect">
             <a:avLst/>
@@ -4222,6 +4254,7 @@
                   <a:srgbClr val="000000"/>
                 </a:solidFill>
                 <a:latin typeface="Calibri Light"/>
+                <a:ea typeface="DejaVu Sans"/>
               </a:rPr>
               <a:t>Nova Feature</a:t>
             </a:r>
@@ -4240,7 +4273,7 @@
         <p:spPr>
           <a:xfrm>
             <a:off x="838080" y="2302200"/>
-            <a:ext cx="10514880" cy="3299400"/>
+            <a:ext cx="10514520" cy="3299040"/>
           </a:xfrm>
           <a:prstGeom prst="rect">
             <a:avLst/>
@@ -4259,7 +4292,7 @@
         <p:txBody>
           <a:bodyPr lIns="90000" rIns="90000" tIns="45000" bIns="45000"/>
           <a:p>
-            <a:pPr marL="228600" indent="-227880">
+            <a:pPr marL="228600" indent="-227520">
               <a:lnSpc>
                 <a:spcPct val="90000"/>
               </a:lnSpc>
@@ -4278,6 +4311,7 @@
                   <a:srgbClr val="7030a0"/>
                 </a:solidFill>
                 <a:latin typeface="Calibri"/>
+                <a:ea typeface="DejaVu Sans"/>
               </a:rPr>
               <a:t>git pull origin</a:t>
             </a:r>
@@ -4286,7 +4320,7 @@
             </a:endParaRPr>
           </a:p>
           <a:p>
-            <a:pPr marL="228600" indent="-227880">
+            <a:pPr marL="228600" indent="-227520">
               <a:lnSpc>
                 <a:spcPct val="90000"/>
               </a:lnSpc>
@@ -4305,6 +4339,7 @@
                   <a:srgbClr val="7030a0"/>
                 </a:solidFill>
                 <a:latin typeface="Calibri"/>
+                <a:ea typeface="DejaVu Sans"/>
               </a:rPr>
               <a:t>git checkout -b feature/{numero da feature}</a:t>
             </a:r>
@@ -4313,7 +4348,7 @@
             </a:endParaRPr>
           </a:p>
           <a:p>
-            <a:pPr marL="228600" indent="-227880">
+            <a:pPr marL="228600" indent="-227520">
               <a:lnSpc>
                 <a:spcPct val="90000"/>
               </a:lnSpc>
@@ -4332,15 +4367,16 @@
                   <a:srgbClr val="7030a0"/>
                 </a:solidFill>
                 <a:latin typeface="Calibri"/>
+                <a:ea typeface="DejaVu Sans"/>
               </a:rPr>
-              <a:t>git push -u feature/{numero da feature}</a:t>
+              <a:t>git push -u origin feature/{numero da feature}</a:t>
             </a:r>
             <a:endParaRPr b="0" lang="pt-BR" sz="2800" spc="-1" strike="noStrike">
               <a:latin typeface="Arial"/>
             </a:endParaRPr>
           </a:p>
           <a:p>
-            <a:pPr marL="228600" indent="-227880">
+            <a:pPr marL="228600" indent="-227520">
               <a:lnSpc>
                 <a:spcPct val="90000"/>
               </a:lnSpc>
@@ -4359,6 +4395,7 @@
                   <a:srgbClr val="7030a0"/>
                 </a:solidFill>
                 <a:latin typeface="Calibri"/>
+                <a:ea typeface="DejaVu Sans"/>
               </a:rPr>
               <a:t>git commit -am "#{numero da feature}: Mensagem do commit“</a:t>
             </a:r>
@@ -4367,7 +4404,7 @@
             </a:endParaRPr>
           </a:p>
           <a:p>
-            <a:pPr marL="228600" indent="-227880">
+            <a:pPr marL="228600" indent="-227520">
               <a:lnSpc>
                 <a:spcPct val="90000"/>
               </a:lnSpc>
@@ -4386,6 +4423,7 @@
                   <a:srgbClr val="7030a0"/>
                 </a:solidFill>
                 <a:latin typeface="Calibri"/>
+                <a:ea typeface="DejaVu Sans"/>
               </a:rPr>
               <a:t>git pull origin</a:t>
             </a:r>
@@ -4394,7 +4432,7 @@
             </a:endParaRPr>
           </a:p>
           <a:p>
-            <a:pPr marL="228600" indent="-227880">
+            <a:pPr marL="228600" indent="-227520">
               <a:lnSpc>
                 <a:spcPct val="90000"/>
               </a:lnSpc>
@@ -4413,6 +4451,7 @@
                   <a:srgbClr val="7030a0"/>
                 </a:solidFill>
                 <a:latin typeface="Calibri"/>
+                <a:ea typeface="DejaVu Sans"/>
               </a:rPr>
               <a:t>git push</a:t>
             </a:r>
@@ -4463,6 +4502,14 @@
       </p:sp>
     </p:spTree>
   </p:cSld>
+  <mc:AlternateContent>
+    <mc:Choice Requires="p14">
+      <p:transition spd="slow" p14:dur="2000"/>
+    </mc:Choice>
+    <mc:Fallback>
+      <p:transition spd="slow"/>
+    </mc:Fallback>
+  </mc:AlternateContent>
   <p:timing>
     <p:tnLst>
       <p:par>
@@ -4519,7 +4566,7 @@
         <p:spPr>
           <a:xfrm>
             <a:off x="838080" y="365040"/>
-            <a:ext cx="10514880" cy="1324800"/>
+            <a:ext cx="10514520" cy="1324440"/>
           </a:xfrm>
           <a:prstGeom prst="rect">
             <a:avLst/>
@@ -4549,6 +4596,7 @@
                   <a:srgbClr val="000000"/>
                 </a:solidFill>
                 <a:latin typeface="Calibri Light"/>
+                <a:ea typeface="DejaVu Sans"/>
               </a:rPr>
               <a:t>Integração da Feature (Merge)</a:t>
             </a:r>
@@ -4567,7 +4615,7 @@
         <p:spPr>
           <a:xfrm>
             <a:off x="838080" y="2032200"/>
-            <a:ext cx="10514880" cy="4350600"/>
+            <a:ext cx="10514520" cy="4350240"/>
           </a:xfrm>
           <a:prstGeom prst="rect">
             <a:avLst/>
@@ -4586,7 +4634,7 @@
         <p:txBody>
           <a:bodyPr lIns="90000" rIns="90000" tIns="45000" bIns="45000"/>
           <a:p>
-            <a:pPr marL="228600" indent="-227880">
+            <a:pPr marL="228600" indent="-227520">
               <a:lnSpc>
                 <a:spcPct val="90000"/>
               </a:lnSpc>
@@ -4605,6 +4653,7 @@
                   <a:srgbClr val="7030a0"/>
                 </a:solidFill>
                 <a:latin typeface="Calibri"/>
+                <a:ea typeface="DejaVu Sans"/>
               </a:rPr>
               <a:t>git pull origin</a:t>
             </a:r>
@@ -4613,7 +4662,7 @@
             </a:endParaRPr>
           </a:p>
           <a:p>
-            <a:pPr marL="228600" indent="-227880">
+            <a:pPr marL="228600" indent="-227520">
               <a:lnSpc>
                 <a:spcPct val="90000"/>
               </a:lnSpc>
@@ -4632,6 +4681,7 @@
                   <a:srgbClr val="7030a0"/>
                 </a:solidFill>
                 <a:latin typeface="Calibri"/>
+                <a:ea typeface="DejaVu Sans"/>
               </a:rPr>
               <a:t>git checkout dsv</a:t>
             </a:r>
@@ -4640,7 +4690,7 @@
             </a:endParaRPr>
           </a:p>
           <a:p>
-            <a:pPr marL="228600" indent="-227880">
+            <a:pPr marL="228600" indent="-227520">
               <a:lnSpc>
                 <a:spcPct val="90000"/>
               </a:lnSpc>
@@ -4659,6 +4709,7 @@
                   <a:srgbClr val="7030a0"/>
                 </a:solidFill>
                 <a:latin typeface="Calibri"/>
+                <a:ea typeface="DejaVu Sans"/>
               </a:rPr>
               <a:t>git merge feature/{numero da feature}</a:t>
             </a:r>
@@ -4667,7 +4718,7 @@
             </a:endParaRPr>
           </a:p>
           <a:p>
-            <a:pPr marL="228600" indent="-227880">
+            <a:pPr marL="228600" indent="-227520">
               <a:lnSpc>
                 <a:spcPct val="90000"/>
               </a:lnSpc>
@@ -4686,6 +4737,7 @@
                   <a:srgbClr val="000000"/>
                 </a:solidFill>
                 <a:latin typeface="Calibri"/>
+                <a:ea typeface="DejaVu Sans"/>
               </a:rPr>
               <a:t>Resolver os conflitos casos existirem com:</a:t>
             </a:r>
@@ -4694,7 +4746,7 @@
             </a:endParaRPr>
           </a:p>
           <a:p>
-            <a:pPr lvl="1" marL="685800" indent="-227880">
+            <a:pPr lvl="1" marL="685800" indent="-227520">
               <a:lnSpc>
                 <a:spcPct val="90000"/>
               </a:lnSpc>
@@ -4713,6 +4765,7 @@
                   <a:srgbClr val="7030a0"/>
                 </a:solidFill>
                 <a:latin typeface="Calibri"/>
+                <a:ea typeface="DejaVu Sans"/>
               </a:rPr>
               <a:t>git mergetool</a:t>
             </a:r>
@@ -4721,7 +4774,7 @@
             </a:endParaRPr>
           </a:p>
           <a:p>
-            <a:pPr lvl="1" marL="685800" indent="-227880">
+            <a:pPr lvl="1" marL="685800" indent="-227520">
               <a:lnSpc>
                 <a:spcPct val="90000"/>
               </a:lnSpc>
@@ -4740,6 +4793,7 @@
                   <a:srgbClr val="7030a0"/>
                 </a:solidFill>
                 <a:latin typeface="Calibri"/>
+                <a:ea typeface="DejaVu Sans"/>
               </a:rPr>
               <a:t>git commit -am "#{numero da feature}: Merge com feature/{numero da feature}“</a:t>
             </a:r>
@@ -4748,7 +4802,7 @@
             </a:endParaRPr>
           </a:p>
           <a:p>
-            <a:pPr lvl="1" marL="685800" indent="-227880">
+            <a:pPr lvl="1" marL="685800" indent="-227520">
               <a:lnSpc>
                 <a:spcPct val="90000"/>
               </a:lnSpc>
@@ -4767,6 +4821,7 @@
                   <a:srgbClr val="7030a0"/>
                 </a:solidFill>
                 <a:latin typeface="Calibri"/>
+                <a:ea typeface="DejaVu Sans"/>
               </a:rPr>
               <a:t>git push</a:t>
             </a:r>
@@ -4821,6 +4876,14 @@
       </p:sp>
     </p:spTree>
   </p:cSld>
+  <mc:AlternateContent>
+    <mc:Choice Requires="p14">
+      <p:transition spd="slow" p14:dur="2000"/>
+    </mc:Choice>
+    <mc:Fallback>
+      <p:transition spd="slow"/>
+    </mc:Fallback>
+  </mc:AlternateContent>
   <p:timing>
     <p:tnLst>
       <p:par>
@@ -4877,7 +4940,7 @@
         <p:spPr>
           <a:xfrm>
             <a:off x="838080" y="365040"/>
-            <a:ext cx="10514880" cy="1324800"/>
+            <a:ext cx="10514520" cy="1324440"/>
           </a:xfrm>
           <a:prstGeom prst="rect">
             <a:avLst/>
@@ -4907,6 +4970,7 @@
                   <a:srgbClr val="000000"/>
                 </a:solidFill>
                 <a:latin typeface="Calibri Light"/>
+                <a:ea typeface="DejaVu Sans"/>
               </a:rPr>
               <a:t>Integração da Feature (Rebase) e Fechamento</a:t>
             </a:r>
@@ -4925,7 +4989,7 @@
         <p:spPr>
           <a:xfrm>
             <a:off x="838080" y="2371320"/>
-            <a:ext cx="10514880" cy="3674880"/>
+            <a:ext cx="10514520" cy="3674520"/>
           </a:xfrm>
           <a:prstGeom prst="rect">
             <a:avLst/>
@@ -4946,7 +5010,7 @@
             <a:normAutofit/>
           </a:bodyPr>
           <a:p>
-            <a:pPr marL="228600" indent="-227880">
+            <a:pPr marL="228600" indent="-227520">
               <a:lnSpc>
                 <a:spcPct val="90000"/>
               </a:lnSpc>
@@ -4965,6 +5029,7 @@
                   <a:srgbClr val="000000"/>
                 </a:solidFill>
                 <a:latin typeface="Calibri"/>
+                <a:ea typeface="DejaVu Sans"/>
               </a:rPr>
               <a:t>Rebase</a:t>
             </a:r>
@@ -4973,7 +5038,7 @@
             </a:endParaRPr>
           </a:p>
           <a:p>
-            <a:pPr lvl="1" marL="685800" indent="-227880">
+            <a:pPr lvl="1" marL="685800" indent="-227520">
               <a:lnSpc>
                 <a:spcPct val="90000"/>
               </a:lnSpc>
@@ -4992,6 +5057,7 @@
                   <a:srgbClr val="7030a0"/>
                 </a:solidFill>
                 <a:latin typeface="Calibri"/>
+                <a:ea typeface="DejaVu Sans"/>
               </a:rPr>
               <a:t>git rebase dsv</a:t>
             </a:r>
@@ -5010,7 +5076,7 @@
             </a:endParaRPr>
           </a:p>
           <a:p>
-            <a:pPr lvl="1" marL="685800" indent="-227880">
+            <a:pPr lvl="1" marL="685800" indent="-227520">
               <a:lnSpc>
                 <a:spcPct val="90000"/>
               </a:lnSpc>
@@ -5029,6 +5095,7 @@
                   <a:srgbClr val="7030a0"/>
                 </a:solidFill>
                 <a:latin typeface="Calibri"/>
+                <a:ea typeface="DejaVu Sans"/>
               </a:rPr>
               <a:t>git push</a:t>
             </a:r>
@@ -5050,7 +5117,7 @@
             </a:endParaRPr>
           </a:p>
           <a:p>
-            <a:pPr marL="228600" indent="-227880">
+            <a:pPr marL="228600" indent="-227520">
               <a:lnSpc>
                 <a:spcPct val="90000"/>
               </a:lnSpc>
@@ -5069,6 +5136,7 @@
                   <a:srgbClr val="000000"/>
                 </a:solidFill>
                 <a:latin typeface="Calibri"/>
+                <a:ea typeface="DejaVu Sans"/>
               </a:rPr>
               <a:t>Fechamento da feature</a:t>
             </a:r>
@@ -5077,7 +5145,7 @@
             </a:endParaRPr>
           </a:p>
           <a:p>
-            <a:pPr lvl="1" marL="685800" indent="-227880">
+            <a:pPr lvl="1" marL="685800" indent="-227520">
               <a:lnSpc>
                 <a:spcPct val="90000"/>
               </a:lnSpc>
@@ -5096,6 +5164,7 @@
                   <a:srgbClr val="7030a0"/>
                 </a:solidFill>
                 <a:latin typeface="Calibri"/>
+                <a:ea typeface="DejaVu Sans"/>
               </a:rPr>
               <a:t>git branch -d feature/{numero da feature}</a:t>
             </a:r>
@@ -5120,6 +5189,14 @@
       </p:sp>
     </p:spTree>
   </p:cSld>
+  <mc:AlternateContent>
+    <mc:Choice Requires="p14">
+      <p:transition spd="slow" p14:dur="2000"/>
+    </mc:Choice>
+    <mc:Fallback>
+      <p:transition spd="slow"/>
+    </mc:Fallback>
+  </mc:AlternateContent>
   <p:timing>
     <p:tnLst>
       <p:par>

</xml_diff>